<commit_message>
modify promises a little bit
</commit_message>
<xml_diff>
--- a/day1/promises/nodejs_promises.pptx
+++ b/day1/promises/nodejs_promises.pptx
@@ -5,7 +5,7 @@
     <p:sldMasterId id="2147483689" r:id="rId1"/>
   </p:sldMasterIdLst>
   <p:notesMasterIdLst>
-    <p:notesMasterId r:id="rId22"/>
+    <p:notesMasterId r:id="rId25"/>
   </p:notesMasterIdLst>
   <p:sldIdLst>
     <p:sldId id="256" r:id="rId2"/>
@@ -14,20 +14,23 @@
     <p:sldId id="315" r:id="rId5"/>
     <p:sldId id="316" r:id="rId6"/>
     <p:sldId id="317" r:id="rId7"/>
-    <p:sldId id="318" r:id="rId8"/>
-    <p:sldId id="319" r:id="rId9"/>
-    <p:sldId id="320" r:id="rId10"/>
-    <p:sldId id="321" r:id="rId11"/>
-    <p:sldId id="323" r:id="rId12"/>
-    <p:sldId id="322" r:id="rId13"/>
-    <p:sldId id="324" r:id="rId14"/>
-    <p:sldId id="325" r:id="rId15"/>
-    <p:sldId id="326" r:id="rId16"/>
-    <p:sldId id="327" r:id="rId17"/>
-    <p:sldId id="328" r:id="rId18"/>
-    <p:sldId id="329" r:id="rId19"/>
-    <p:sldId id="330" r:id="rId20"/>
-    <p:sldId id="304" r:id="rId21"/>
+    <p:sldId id="331" r:id="rId8"/>
+    <p:sldId id="318" r:id="rId9"/>
+    <p:sldId id="319" r:id="rId10"/>
+    <p:sldId id="320" r:id="rId11"/>
+    <p:sldId id="321" r:id="rId12"/>
+    <p:sldId id="323" r:id="rId13"/>
+    <p:sldId id="322" r:id="rId14"/>
+    <p:sldId id="324" r:id="rId15"/>
+    <p:sldId id="333" r:id="rId16"/>
+    <p:sldId id="325" r:id="rId17"/>
+    <p:sldId id="332" r:id="rId18"/>
+    <p:sldId id="326" r:id="rId19"/>
+    <p:sldId id="327" r:id="rId20"/>
+    <p:sldId id="328" r:id="rId21"/>
+    <p:sldId id="329" r:id="rId22"/>
+    <p:sldId id="330" r:id="rId23"/>
+    <p:sldId id="304" r:id="rId24"/>
   </p:sldIdLst>
   <p:sldSz cx="9144000" cy="6858000" type="screen4x3"/>
   <p:notesSz cx="6858000" cy="9144000"/>
@@ -128,7 +131,7 @@
   </p:defaultTextStyle>
   <p:extLst>
     <p:ext uri="{EFAFB233-063F-42B5-8137-9DF3F51BA10A}">
-      <p15:sldGuideLst xmlns="" xmlns:p15="http://schemas.microsoft.com/office/powerpoint/2012/main">
+      <p15:sldGuideLst xmlns:p15="http://schemas.microsoft.com/office/powerpoint/2012/main" xmlns="">
         <p15:guide id="1" orient="horz" pos="2160">
           <p15:clr>
             <a:srgbClr val="A4A3A4"/>
@@ -227,7 +230,7 @@
           <a:p>
             <a:fld id="{1E64356D-F091-4486-B0BB-66BE03FC5D73}" type="datetimeFigureOut">
               <a:rPr lang="en-US" smtClean="0"/>
-              <a:t>4/3/2018</a:t>
+              <a:t>4/20/2018</a:t>
             </a:fld>
             <a:endParaRPr lang="en-US"/>
           </a:p>
@@ -1373,7 +1376,7 @@
             <a:fld id="{1D8BD707-D9CF-40AE-B4C6-C98DA3205C09}" type="datetimeFigureOut">
               <a:rPr lang="en-US" smtClean="0"/>
               <a:pPr/>
-              <a:t>4/3/2018</a:t>
+              <a:t>4/20/2018</a:t>
             </a:fld>
             <a:endParaRPr lang="en-US"/>
           </a:p>
@@ -1626,7 +1629,7 @@
             <a:fld id="{1D8BD707-D9CF-40AE-B4C6-C98DA3205C09}" type="datetimeFigureOut">
               <a:rPr lang="en-US" smtClean="0"/>
               <a:pPr/>
-              <a:t>4/3/2018</a:t>
+              <a:t>4/20/2018</a:t>
             </a:fld>
             <a:endParaRPr lang="en-US"/>
           </a:p>
@@ -1942,7 +1945,7 @@
             <a:fld id="{1D8BD707-D9CF-40AE-B4C6-C98DA3205C09}" type="datetimeFigureOut">
               <a:rPr lang="en-US" smtClean="0"/>
               <a:pPr/>
-              <a:t>4/3/2018</a:t>
+              <a:t>4/20/2018</a:t>
             </a:fld>
             <a:endParaRPr lang="en-US"/>
           </a:p>
@@ -2277,7 +2280,7 @@
             <a:fld id="{1D8BD707-D9CF-40AE-B4C6-C98DA3205C09}" type="datetimeFigureOut">
               <a:rPr lang="en-US" smtClean="0"/>
               <a:pPr/>
-              <a:t>4/3/2018</a:t>
+              <a:t>4/20/2018</a:t>
             </a:fld>
             <a:endParaRPr lang="en-US"/>
           </a:p>
@@ -2593,7 +2596,7 @@
             <a:fld id="{1D8BD707-D9CF-40AE-B4C6-C98DA3205C09}" type="datetimeFigureOut">
               <a:rPr lang="en-US" smtClean="0"/>
               <a:pPr/>
-              <a:t>4/3/2018</a:t>
+              <a:t>4/20/2018</a:t>
             </a:fld>
             <a:endParaRPr lang="en-US"/>
           </a:p>
@@ -2988,7 +2991,7 @@
             <a:fld id="{1D8BD707-D9CF-40AE-B4C6-C98DA3205C09}" type="datetimeFigureOut">
               <a:rPr lang="en-US" smtClean="0"/>
               <a:pPr/>
-              <a:t>4/3/2018</a:t>
+              <a:t>4/20/2018</a:t>
             </a:fld>
             <a:endParaRPr lang="en-US"/>
           </a:p>
@@ -3160,7 +3163,7 @@
             <a:fld id="{1D8BD707-D9CF-40AE-B4C6-C98DA3205C09}" type="datetimeFigureOut">
               <a:rPr lang="en-US" smtClean="0"/>
               <a:pPr/>
-              <a:t>4/3/2018</a:t>
+              <a:t>4/20/2018</a:t>
             </a:fld>
             <a:endParaRPr lang="en-US"/>
           </a:p>
@@ -3342,7 +3345,7 @@
             <a:fld id="{1D8BD707-D9CF-40AE-B4C6-C98DA3205C09}" type="datetimeFigureOut">
               <a:rPr lang="en-US" smtClean="0"/>
               <a:pPr/>
-              <a:t>4/3/2018</a:t>
+              <a:t>4/20/2018</a:t>
             </a:fld>
             <a:endParaRPr lang="en-US"/>
           </a:p>
@@ -3514,7 +3517,7 @@
             <a:fld id="{1D8BD707-D9CF-40AE-B4C6-C98DA3205C09}" type="datetimeFigureOut">
               <a:rPr lang="en-US" smtClean="0"/>
               <a:pPr/>
-              <a:t>4/3/2018</a:t>
+              <a:t>4/20/2018</a:t>
             </a:fld>
             <a:endParaRPr lang="en-US"/>
           </a:p>
@@ -3763,7 +3766,7 @@
             <a:fld id="{1D8BD707-D9CF-40AE-B4C6-C98DA3205C09}" type="datetimeFigureOut">
               <a:rPr lang="en-US" smtClean="0"/>
               <a:pPr/>
-              <a:t>4/3/2018</a:t>
+              <a:t>4/20/2018</a:t>
             </a:fld>
             <a:endParaRPr lang="en-US"/>
           </a:p>
@@ -4062,7 +4065,7 @@
             <a:fld id="{1D8BD707-D9CF-40AE-B4C6-C98DA3205C09}" type="datetimeFigureOut">
               <a:rPr lang="en-US" smtClean="0"/>
               <a:pPr/>
-              <a:t>4/3/2018</a:t>
+              <a:t>4/20/2018</a:t>
             </a:fld>
             <a:endParaRPr lang="en-US"/>
           </a:p>
@@ -4443,7 +4446,7 @@
             <a:fld id="{1D8BD707-D9CF-40AE-B4C6-C98DA3205C09}" type="datetimeFigureOut">
               <a:rPr lang="en-US" smtClean="0"/>
               <a:pPr/>
-              <a:t>4/3/2018</a:t>
+              <a:t>4/20/2018</a:t>
             </a:fld>
             <a:endParaRPr lang="en-US"/>
           </a:p>
@@ -4568,7 +4571,7 @@
             <a:fld id="{1D8BD707-D9CF-40AE-B4C6-C98DA3205C09}" type="datetimeFigureOut">
               <a:rPr lang="en-US" smtClean="0"/>
               <a:pPr/>
-              <a:t>4/3/2018</a:t>
+              <a:t>4/20/2018</a:t>
             </a:fld>
             <a:endParaRPr lang="en-US"/>
           </a:p>
@@ -4665,7 +4668,7 @@
             <a:fld id="{1D8BD707-D9CF-40AE-B4C6-C98DA3205C09}" type="datetimeFigureOut">
               <a:rPr lang="en-US" smtClean="0"/>
               <a:pPr/>
-              <a:t>4/3/2018</a:t>
+              <a:t>4/20/2018</a:t>
             </a:fld>
             <a:endParaRPr lang="en-US"/>
           </a:p>
@@ -4922,7 +4925,7 @@
             <a:fld id="{1D8BD707-D9CF-40AE-B4C6-C98DA3205C09}" type="datetimeFigureOut">
               <a:rPr lang="en-US" smtClean="0"/>
               <a:pPr/>
-              <a:t>4/3/2018</a:t>
+              <a:t>4/20/2018</a:t>
             </a:fld>
             <a:endParaRPr lang="en-US"/>
           </a:p>
@@ -5187,7 +5190,7 @@
             <a:fld id="{1D8BD707-D9CF-40AE-B4C6-C98DA3205C09}" type="datetimeFigureOut">
               <a:rPr lang="en-US" smtClean="0"/>
               <a:pPr/>
-              <a:t>4/3/2018</a:t>
+              <a:t>4/20/2018</a:t>
             </a:fld>
             <a:endParaRPr lang="en-US"/>
           </a:p>
@@ -6003,7 +6006,7 @@
             <a:fld id="{1D8BD707-D9CF-40AE-B4C6-C98DA3205C09}" type="datetimeFigureOut">
               <a:rPr lang="en-US" smtClean="0"/>
               <a:pPr/>
-              <a:t>4/3/2018</a:t>
+              <a:t>4/20/2018</a:t>
             </a:fld>
             <a:endParaRPr lang="en-US"/>
           </a:p>
@@ -6684,28 +6687,61 @@
             <p:ph type="title"/>
           </p:nvPr>
         </p:nvSpPr>
+        <p:spPr/>
+        <p:txBody>
+          <a:bodyPr/>
+          <a:lstStyle/>
+          <a:p>
+            <a:r>
+              <a:rPr lang="en-US" dirty="0" smtClean="0"/>
+              <a:t>First came </a:t>
+            </a:r>
+            <a:r>
+              <a:rPr lang="en-US" dirty="0" err="1" smtClean="0"/>
+              <a:t>async</a:t>
+            </a:r>
+            <a:r>
+              <a:rPr lang="en-US" dirty="0" smtClean="0"/>
+              <a:t> library</a:t>
+            </a:r>
+            <a:endParaRPr lang="en-US" dirty="0"/>
+          </a:p>
+        </p:txBody>
+      </p:sp>
+      <p:pic>
+        <p:nvPicPr>
+          <p:cNvPr id="4" name="Picture 3"/>
+          <p:cNvPicPr>
+            <a:picLocks noChangeAspect="1"/>
+          </p:cNvPicPr>
+          <p:nvPr/>
+        </p:nvPicPr>
+        <p:blipFill>
+          <a:blip r:embed="rId2">
+            <a:extLst>
+              <a:ext uri="{28A0092B-C50C-407E-A947-70E740481C1C}">
+                <a14:useLocalDpi xmlns:a14="http://schemas.microsoft.com/office/drawing/2010/main" val="0"/>
+              </a:ext>
+            </a:extLst>
+          </a:blip>
+          <a:stretch>
+            <a:fillRect/>
+          </a:stretch>
+        </p:blipFill>
         <p:spPr>
           <a:xfrm>
-            <a:off x="457200" y="2667000"/>
-            <a:ext cx="8229600" cy="1143000"/>
+            <a:off x="685800" y="1828800"/>
+            <a:ext cx="6901368" cy="1524000"/>
           </a:xfrm>
+          <a:prstGeom prst="rect">
+            <a:avLst/>
+          </a:prstGeom>
         </p:spPr>
-        <p:txBody>
-          <a:bodyPr/>
-          <a:lstStyle/>
-          <a:p>
-            <a:r>
-              <a:rPr lang="en-US" dirty="0" smtClean="0"/>
-              <a:t>Promises</a:t>
-            </a:r>
-            <a:endParaRPr lang="en-US" dirty="0"/>
-          </a:p>
-        </p:txBody>
-      </p:sp>
+      </p:pic>
     </p:spTree>
     <p:extLst>
       <p:ext uri="{BB962C8B-B14F-4D97-AF65-F5344CB8AC3E}">
-        <p14:creationId xmlns:p14="http://schemas.microsoft.com/office/powerpoint/2010/main" val="1742691112"/>
+        <p14:creationId xmlns:p14="http://schemas.microsoft.com/office/powerpoint/2010/main" val="3283686610"/>
       </p:ext>
     </p:extLst>
   </p:cSld>
@@ -6742,6 +6778,64 @@
             <p:ph type="title"/>
           </p:nvPr>
         </p:nvSpPr>
+        <p:spPr>
+          <a:xfrm>
+            <a:off x="457200" y="2667000"/>
+            <a:ext cx="8229600" cy="1143000"/>
+          </a:xfrm>
+        </p:spPr>
+        <p:txBody>
+          <a:bodyPr/>
+          <a:lstStyle/>
+          <a:p>
+            <a:r>
+              <a:rPr lang="en-US" dirty="0" smtClean="0"/>
+              <a:t>Promises</a:t>
+            </a:r>
+            <a:endParaRPr lang="en-US" dirty="0"/>
+          </a:p>
+        </p:txBody>
+      </p:sp>
+    </p:spTree>
+    <p:extLst>
+      <p:ext uri="{BB962C8B-B14F-4D97-AF65-F5344CB8AC3E}">
+        <p14:creationId xmlns:p14="http://schemas.microsoft.com/office/powerpoint/2010/main" val="1742691112"/>
+      </p:ext>
+    </p:extLst>
+  </p:cSld>
+  <p:clrMapOvr>
+    <a:masterClrMapping/>
+  </p:clrMapOvr>
+</p:sld>
+</file>
+
+<file path=ppt/slides/slide12.xml><?xml version="1.0" encoding="utf-8"?>
+<p:sld xmlns:a="http://schemas.openxmlformats.org/drawingml/2006/main" xmlns:r="http://schemas.openxmlformats.org/officeDocument/2006/relationships" xmlns:p="http://schemas.openxmlformats.org/presentationml/2006/main">
+  <p:cSld>
+    <p:spTree>
+      <p:nvGrpSpPr>
+        <p:cNvPr id="1" name=""/>
+        <p:cNvGrpSpPr/>
+        <p:nvPr/>
+      </p:nvGrpSpPr>
+      <p:grpSpPr>
+        <a:xfrm>
+          <a:off x="0" y="0"/>
+          <a:ext cx="0" cy="0"/>
+          <a:chOff x="0" y="0"/>
+          <a:chExt cx="0" cy="0"/>
+        </a:xfrm>
+      </p:grpSpPr>
+      <p:sp>
+        <p:nvSpPr>
+          <p:cNvPr id="2" name="Title 1"/>
+          <p:cNvSpPr>
+            <a:spLocks noGrp="1"/>
+          </p:cNvSpPr>
+          <p:nvPr>
+            <p:ph type="title"/>
+          </p:nvPr>
+        </p:nvSpPr>
         <p:spPr/>
         <p:txBody>
           <a:bodyPr/>
@@ -6817,7 +6911,7 @@
 </p:sld>
 </file>
 
-<file path=ppt/slides/slide12.xml><?xml version="1.0" encoding="utf-8"?>
+<file path=ppt/slides/slide13.xml><?xml version="1.0" encoding="utf-8"?>
 <p:sld xmlns:a="http://schemas.openxmlformats.org/drawingml/2006/main" xmlns:r="http://schemas.openxmlformats.org/officeDocument/2006/relationships" xmlns:p="http://schemas.openxmlformats.org/presentationml/2006/main">
   <p:cSld>
     <p:spTree>
@@ -6900,7 +6994,7 @@
 </p:sld>
 </file>
 
-<file path=ppt/slides/slide13.xml><?xml version="1.0" encoding="utf-8"?>
+<file path=ppt/slides/slide14.xml><?xml version="1.0" encoding="utf-8"?>
 <p:sld xmlns:a="http://schemas.openxmlformats.org/drawingml/2006/main" xmlns:r="http://schemas.openxmlformats.org/officeDocument/2006/relationships" xmlns:p="http://schemas.openxmlformats.org/presentationml/2006/main">
   <p:cSld>
     <p:spTree>
@@ -6983,7 +7077,7 @@
 </p:sld>
 </file>
 
-<file path=ppt/slides/slide14.xml><?xml version="1.0" encoding="utf-8"?>
+<file path=ppt/slides/slide15.xml><?xml version="1.0" encoding="utf-8"?>
 <p:sld xmlns:a="http://schemas.openxmlformats.org/drawingml/2006/main" xmlns:r="http://schemas.openxmlformats.org/officeDocument/2006/relationships" xmlns:p="http://schemas.openxmlformats.org/presentationml/2006/main">
   <p:cSld>
     <p:spTree>
@@ -7010,6 +7104,63 @@
             <p:ph type="title"/>
           </p:nvPr>
         </p:nvSpPr>
+        <p:spPr>
+          <a:xfrm>
+            <a:off x="662687" y="2133600"/>
+            <a:ext cx="6347713" cy="1320800"/>
+          </a:xfrm>
+        </p:spPr>
+        <p:txBody>
+          <a:bodyPr/>
+          <a:lstStyle/>
+          <a:p>
+            <a:r>
+              <a:rPr lang="en-US" dirty="0"/>
+              <a:t>Working with Promises on Asynchronous code</a:t>
+            </a:r>
+          </a:p>
+        </p:txBody>
+      </p:sp>
+    </p:spTree>
+    <p:extLst>
+      <p:ext uri="{BB962C8B-B14F-4D97-AF65-F5344CB8AC3E}">
+        <p14:creationId xmlns:p14="http://schemas.microsoft.com/office/powerpoint/2010/main" val="4094227827"/>
+      </p:ext>
+    </p:extLst>
+  </p:cSld>
+  <p:clrMapOvr>
+    <a:masterClrMapping/>
+  </p:clrMapOvr>
+</p:sld>
+</file>
+
+<file path=ppt/slides/slide16.xml><?xml version="1.0" encoding="utf-8"?>
+<p:sld xmlns:a="http://schemas.openxmlformats.org/drawingml/2006/main" xmlns:r="http://schemas.openxmlformats.org/officeDocument/2006/relationships" xmlns:p="http://schemas.openxmlformats.org/presentationml/2006/main">
+  <p:cSld>
+    <p:spTree>
+      <p:nvGrpSpPr>
+        <p:cNvPr id="1" name=""/>
+        <p:cNvGrpSpPr/>
+        <p:nvPr/>
+      </p:nvGrpSpPr>
+      <p:grpSpPr>
+        <a:xfrm>
+          <a:off x="0" y="0"/>
+          <a:ext cx="0" cy="0"/>
+          <a:chOff x="0" y="0"/>
+          <a:chExt cx="0" cy="0"/>
+        </a:xfrm>
+      </p:grpSpPr>
+      <p:sp>
+        <p:nvSpPr>
+          <p:cNvPr id="2" name="Title 1"/>
+          <p:cNvSpPr>
+            <a:spLocks noGrp="1"/>
+          </p:cNvSpPr>
+          <p:nvPr>
+            <p:ph type="title"/>
+          </p:nvPr>
+        </p:nvSpPr>
         <p:spPr/>
         <p:txBody>
           <a:bodyPr/>
@@ -7017,7 +7168,7 @@
           <a:p>
             <a:r>
               <a:rPr lang="en-US" dirty="0" smtClean="0"/>
-              <a:t>Working with Promises on Asynchronous code</a:t>
+              <a:t>Wrapping Your API With Promise – Use “New Promise”</a:t>
             </a:r>
             <a:endParaRPr lang="en-US" dirty="0"/>
           </a:p>
@@ -7066,7 +7217,7 @@
 </p:sld>
 </file>
 
-<file path=ppt/slides/slide15.xml><?xml version="1.0" encoding="utf-8"?>
+<file path=ppt/slides/slide17.xml><?xml version="1.0" encoding="utf-8"?>
 <p:sld xmlns:a="http://schemas.openxmlformats.org/drawingml/2006/main" xmlns:r="http://schemas.openxmlformats.org/officeDocument/2006/relationships" xmlns:p="http://schemas.openxmlformats.org/presentationml/2006/main">
   <p:cSld>
     <p:spTree>
@@ -7093,6 +7244,99 @@
             <p:ph type="title"/>
           </p:nvPr>
         </p:nvSpPr>
+        <p:spPr/>
+        <p:txBody>
+          <a:bodyPr>
+            <a:normAutofit fontScale="90000"/>
+          </a:bodyPr>
+          <a:lstStyle/>
+          <a:p>
+            <a:r>
+              <a:rPr lang="en-US" dirty="0" smtClean="0"/>
+              <a:t>Use </a:t>
+            </a:r>
+            <a:r>
+              <a:rPr lang="en-US" dirty="0" err="1" smtClean="0"/>
+              <a:t>PromisifyAll</a:t>
+            </a:r>
+            <a:r>
+              <a:rPr lang="en-US" dirty="0" smtClean="0"/>
+              <a:t> To Automatically Convert API To Promises</a:t>
+            </a:r>
+            <a:endParaRPr lang="en-US" dirty="0"/>
+          </a:p>
+        </p:txBody>
+      </p:sp>
+      <p:pic>
+        <p:nvPicPr>
+          <p:cNvPr id="4" name="Picture 3"/>
+          <p:cNvPicPr>
+            <a:picLocks noChangeAspect="1"/>
+          </p:cNvPicPr>
+          <p:nvPr/>
+        </p:nvPicPr>
+        <p:blipFill>
+          <a:blip r:embed="rId2">
+            <a:extLst>
+              <a:ext uri="{28A0092B-C50C-407E-A947-70E740481C1C}">
+                <a14:useLocalDpi xmlns:a14="http://schemas.microsoft.com/office/drawing/2010/main" val="0"/>
+              </a:ext>
+            </a:extLst>
+          </a:blip>
+          <a:stretch>
+            <a:fillRect/>
+          </a:stretch>
+        </p:blipFill>
+        <p:spPr>
+          <a:xfrm>
+            <a:off x="685800" y="2233389"/>
+            <a:ext cx="7930320" cy="2110011"/>
+          </a:xfrm>
+          <a:prstGeom prst="rect">
+            <a:avLst/>
+          </a:prstGeom>
+        </p:spPr>
+      </p:pic>
+    </p:spTree>
+    <p:extLst>
+      <p:ext uri="{BB962C8B-B14F-4D97-AF65-F5344CB8AC3E}">
+        <p14:creationId xmlns:p14="http://schemas.microsoft.com/office/powerpoint/2010/main" val="4074456724"/>
+      </p:ext>
+    </p:extLst>
+  </p:cSld>
+  <p:clrMapOvr>
+    <a:masterClrMapping/>
+  </p:clrMapOvr>
+</p:sld>
+</file>
+
+<file path=ppt/slides/slide18.xml><?xml version="1.0" encoding="utf-8"?>
+<p:sld xmlns:a="http://schemas.openxmlformats.org/drawingml/2006/main" xmlns:r="http://schemas.openxmlformats.org/officeDocument/2006/relationships" xmlns:p="http://schemas.openxmlformats.org/presentationml/2006/main">
+  <p:cSld>
+    <p:spTree>
+      <p:nvGrpSpPr>
+        <p:cNvPr id="1" name=""/>
+        <p:cNvGrpSpPr/>
+        <p:nvPr/>
+      </p:nvGrpSpPr>
+      <p:grpSpPr>
+        <a:xfrm>
+          <a:off x="0" y="0"/>
+          <a:ext cx="0" cy="0"/>
+          <a:chOff x="0" y="0"/>
+          <a:chExt cx="0" cy="0"/>
+        </a:xfrm>
+      </p:grpSpPr>
+      <p:sp>
+        <p:nvSpPr>
+          <p:cNvPr id="2" name="Title 1"/>
+          <p:cNvSpPr>
+            <a:spLocks noGrp="1"/>
+          </p:cNvSpPr>
+          <p:nvPr>
+            <p:ph type="title"/>
+          </p:nvPr>
+        </p:nvSpPr>
         <p:spPr>
           <a:xfrm>
             <a:off x="533400" y="1981200"/>
@@ -7124,7 +7368,7 @@
 </p:sld>
 </file>
 
-<file path=ppt/slides/slide16.xml><?xml version="1.0" encoding="utf-8"?>
+<file path=ppt/slides/slide19.xml><?xml version="1.0" encoding="utf-8"?>
 <p:sld xmlns:a="http://schemas.openxmlformats.org/drawingml/2006/main" xmlns:r="http://schemas.openxmlformats.org/officeDocument/2006/relationships" xmlns:p="http://schemas.openxmlformats.org/presentationml/2006/main">
   <p:cSld>
     <p:spTree>
@@ -7207,7 +7451,122 @@
 </p:sld>
 </file>
 
-<file path=ppt/slides/slide17.xml><?xml version="1.0" encoding="utf-8"?>
+<file path=ppt/slides/slide2.xml><?xml version="1.0" encoding="utf-8"?>
+<p:sld xmlns:a="http://schemas.openxmlformats.org/drawingml/2006/main" xmlns:r="http://schemas.openxmlformats.org/officeDocument/2006/relationships" xmlns:p="http://schemas.openxmlformats.org/presentationml/2006/main">
+  <p:cSld>
+    <p:spTree>
+      <p:nvGrpSpPr>
+        <p:cNvPr id="1" name=""/>
+        <p:cNvGrpSpPr/>
+        <p:nvPr/>
+      </p:nvGrpSpPr>
+      <p:grpSpPr>
+        <a:xfrm>
+          <a:off x="0" y="0"/>
+          <a:ext cx="0" cy="0"/>
+          <a:chOff x="0" y="0"/>
+          <a:chExt cx="0" cy="0"/>
+        </a:xfrm>
+      </p:grpSpPr>
+      <p:sp>
+        <p:nvSpPr>
+          <p:cNvPr id="2" name="Title 1"/>
+          <p:cNvSpPr>
+            <a:spLocks noGrp="1"/>
+          </p:cNvSpPr>
+          <p:nvPr>
+            <p:ph type="title"/>
+          </p:nvPr>
+        </p:nvSpPr>
+        <p:spPr/>
+        <p:txBody>
+          <a:bodyPr/>
+          <a:lstStyle/>
+          <a:p>
+            <a:r>
+              <a:rPr lang="en-US" dirty="0" smtClean="0"/>
+              <a:t>Agenda</a:t>
+            </a:r>
+            <a:endParaRPr lang="en-US" dirty="0"/>
+          </a:p>
+        </p:txBody>
+      </p:sp>
+      <p:sp>
+        <p:nvSpPr>
+          <p:cNvPr id="3" name="Content Placeholder 2"/>
+          <p:cNvSpPr>
+            <a:spLocks noGrp="1"/>
+          </p:cNvSpPr>
+          <p:nvPr>
+            <p:ph idx="1"/>
+          </p:nvPr>
+        </p:nvSpPr>
+        <p:spPr/>
+        <p:txBody>
+          <a:bodyPr/>
+          <a:lstStyle/>
+          <a:p>
+            <a:r>
+              <a:rPr lang="en-US" dirty="0" smtClean="0"/>
+              <a:t>Asynchronous programming</a:t>
+            </a:r>
+          </a:p>
+          <a:p>
+            <a:r>
+              <a:rPr lang="en-US" dirty="0" smtClean="0"/>
+              <a:t>Asynchronous programming problems</a:t>
+            </a:r>
+          </a:p>
+          <a:p>
+            <a:r>
+              <a:rPr lang="en-US" dirty="0" smtClean="0"/>
+              <a:t>What are promises and how to use them</a:t>
+            </a:r>
+          </a:p>
+          <a:p>
+            <a:r>
+              <a:rPr lang="en-US" dirty="0" smtClean="0"/>
+              <a:t>Implement different control flows with promises</a:t>
+            </a:r>
+          </a:p>
+          <a:p>
+            <a:r>
+              <a:rPr lang="en-US" dirty="0" smtClean="0"/>
+              <a:t>Promise libraries</a:t>
+            </a:r>
+          </a:p>
+          <a:p>
+            <a:r>
+              <a:rPr lang="en-US" dirty="0" smtClean="0"/>
+              <a:t>A specific problem I solved with promises</a:t>
+            </a:r>
+          </a:p>
+          <a:p>
+            <a:endParaRPr lang="en-US" dirty="0"/>
+          </a:p>
+        </p:txBody>
+      </p:sp>
+    </p:spTree>
+    <p:extLst>
+      <p:ext uri="{BB962C8B-B14F-4D97-AF65-F5344CB8AC3E}">
+        <p14:creationId xmlns:p14="http://schemas.microsoft.com/office/powerpoint/2010/main" val="1790054153"/>
+      </p:ext>
+    </p:extLst>
+  </p:cSld>
+  <p:clrMapOvr>
+    <a:masterClrMapping/>
+  </p:clrMapOvr>
+  <p:timing>
+    <p:tnLst>
+      <p:par>
+        <p:cTn id="1" dur="indefinite" restart="never" nodeType="tmRoot"/>
+      </p:par>
+    </p:tnLst>
+  </p:timing>
+</p:sld>
+</file>
+
+<file path=ppt/slides/slide20.xml><?xml version="1.0" encoding="utf-8"?>
 <p:sld xmlns:a="http://schemas.openxmlformats.org/drawingml/2006/main" xmlns:r="http://schemas.openxmlformats.org/officeDocument/2006/relationships" xmlns:p="http://schemas.openxmlformats.org/presentationml/2006/main">
   <p:cSld>
     <p:spTree>
@@ -7341,7 +7700,7 @@
 </p:sld>
 </file>
 
-<file path=ppt/slides/slide18.xml><?xml version="1.0" encoding="utf-8"?>
+<file path=ppt/slides/slide21.xml><?xml version="1.0" encoding="utf-8"?>
 <p:sld xmlns:a="http://schemas.openxmlformats.org/drawingml/2006/main" xmlns:r="http://schemas.openxmlformats.org/officeDocument/2006/relationships" xmlns:p="http://schemas.openxmlformats.org/presentationml/2006/main">
   <p:cSld>
     <p:spTree>
@@ -7513,7 +7872,7 @@
 </p:sld>
 </file>
 
-<file path=ppt/slides/slide19.xml><?xml version="1.0" encoding="utf-8"?>
+<file path=ppt/slides/slide22.xml><?xml version="1.0" encoding="utf-8"?>
 <p:sld xmlns:a="http://schemas.openxmlformats.org/drawingml/2006/main" xmlns:r="http://schemas.openxmlformats.org/officeDocument/2006/relationships" xmlns:p="http://schemas.openxmlformats.org/presentationml/2006/main">
   <p:cSld>
     <p:spTree>
@@ -7621,122 +7980,7 @@
 </p:sld>
 </file>
 
-<file path=ppt/slides/slide2.xml><?xml version="1.0" encoding="utf-8"?>
-<p:sld xmlns:a="http://schemas.openxmlformats.org/drawingml/2006/main" xmlns:r="http://schemas.openxmlformats.org/officeDocument/2006/relationships" xmlns:p="http://schemas.openxmlformats.org/presentationml/2006/main">
-  <p:cSld>
-    <p:spTree>
-      <p:nvGrpSpPr>
-        <p:cNvPr id="1" name=""/>
-        <p:cNvGrpSpPr/>
-        <p:nvPr/>
-      </p:nvGrpSpPr>
-      <p:grpSpPr>
-        <a:xfrm>
-          <a:off x="0" y="0"/>
-          <a:ext cx="0" cy="0"/>
-          <a:chOff x="0" y="0"/>
-          <a:chExt cx="0" cy="0"/>
-        </a:xfrm>
-      </p:grpSpPr>
-      <p:sp>
-        <p:nvSpPr>
-          <p:cNvPr id="2" name="Title 1"/>
-          <p:cNvSpPr>
-            <a:spLocks noGrp="1"/>
-          </p:cNvSpPr>
-          <p:nvPr>
-            <p:ph type="title"/>
-          </p:nvPr>
-        </p:nvSpPr>
-        <p:spPr/>
-        <p:txBody>
-          <a:bodyPr/>
-          <a:lstStyle/>
-          <a:p>
-            <a:r>
-              <a:rPr lang="en-US" dirty="0" smtClean="0"/>
-              <a:t>Agenda</a:t>
-            </a:r>
-            <a:endParaRPr lang="en-US" dirty="0"/>
-          </a:p>
-        </p:txBody>
-      </p:sp>
-      <p:sp>
-        <p:nvSpPr>
-          <p:cNvPr id="3" name="Content Placeholder 2"/>
-          <p:cNvSpPr>
-            <a:spLocks noGrp="1"/>
-          </p:cNvSpPr>
-          <p:nvPr>
-            <p:ph idx="1"/>
-          </p:nvPr>
-        </p:nvSpPr>
-        <p:spPr/>
-        <p:txBody>
-          <a:bodyPr/>
-          <a:lstStyle/>
-          <a:p>
-            <a:r>
-              <a:rPr lang="en-US" dirty="0" smtClean="0"/>
-              <a:t>Asynchronous programming</a:t>
-            </a:r>
-          </a:p>
-          <a:p>
-            <a:r>
-              <a:rPr lang="en-US" dirty="0" smtClean="0"/>
-              <a:t>Asynchronous programming problems</a:t>
-            </a:r>
-          </a:p>
-          <a:p>
-            <a:r>
-              <a:rPr lang="en-US" dirty="0" smtClean="0"/>
-              <a:t>What are promises and how to use them</a:t>
-            </a:r>
-          </a:p>
-          <a:p>
-            <a:r>
-              <a:rPr lang="en-US" dirty="0" smtClean="0"/>
-              <a:t>Implement different control flows with promises</a:t>
-            </a:r>
-          </a:p>
-          <a:p>
-            <a:r>
-              <a:rPr lang="en-US" dirty="0" smtClean="0"/>
-              <a:t>Promise libraries</a:t>
-            </a:r>
-          </a:p>
-          <a:p>
-            <a:r>
-              <a:rPr lang="en-US" dirty="0" smtClean="0"/>
-              <a:t>A specific problem I solved with promises</a:t>
-            </a:r>
-          </a:p>
-          <a:p>
-            <a:endParaRPr lang="en-US" dirty="0"/>
-          </a:p>
-        </p:txBody>
-      </p:sp>
-    </p:spTree>
-    <p:extLst>
-      <p:ext uri="{BB962C8B-B14F-4D97-AF65-F5344CB8AC3E}">
-        <p14:creationId xmlns:p14="http://schemas.microsoft.com/office/powerpoint/2010/main" val="1790054153"/>
-      </p:ext>
-    </p:extLst>
-  </p:cSld>
-  <p:clrMapOvr>
-    <a:masterClrMapping/>
-  </p:clrMapOvr>
-  <p:timing>
-    <p:tnLst>
-      <p:par>
-        <p:cTn id="1" dur="indefinite" restart="never" nodeType="tmRoot"/>
-      </p:par>
-    </p:tnLst>
-  </p:timing>
-</p:sld>
-</file>
-
-<file path=ppt/slides/slide20.xml><?xml version="1.0" encoding="utf-8"?>
+<file path=ppt/slides/slide23.xml><?xml version="1.0" encoding="utf-8"?>
 <p:sld xmlns:a="http://schemas.openxmlformats.org/drawingml/2006/main" xmlns:r="http://schemas.openxmlformats.org/officeDocument/2006/relationships" xmlns:p="http://schemas.openxmlformats.org/presentationml/2006/main">
   <p:cSld>
     <p:spTree>
@@ -8082,14 +8326,23 @@
             <p:ph type="title"/>
           </p:nvPr>
         </p:nvSpPr>
-        <p:spPr/>
+        <p:spPr>
+          <a:xfrm>
+            <a:off x="609599" y="457200"/>
+            <a:ext cx="6347713" cy="1320800"/>
+          </a:xfrm>
+        </p:spPr>
         <p:txBody>
           <a:bodyPr/>
           <a:lstStyle/>
           <a:p>
             <a:r>
               <a:rPr lang="en-US" dirty="0" smtClean="0"/>
-              <a:t>The Pyramid of Doom</a:t>
+              <a:t>The Pyramid of </a:t>
+            </a:r>
+            <a:r>
+              <a:rPr lang="en-US" dirty="0" smtClean="0"/>
+              <a:t>Doom – Callback hell</a:t>
             </a:r>
             <a:endParaRPr lang="en-US" dirty="0"/>
           </a:p>
@@ -8165,6 +8418,89 @@
             <p:ph type="title"/>
           </p:nvPr>
         </p:nvSpPr>
+        <p:spPr/>
+        <p:txBody>
+          <a:bodyPr/>
+          <a:lstStyle/>
+          <a:p>
+            <a:r>
+              <a:rPr lang="en-US" dirty="0" smtClean="0"/>
+              <a:t>Easy To Miss Error Handling</a:t>
+            </a:r>
+            <a:endParaRPr lang="en-US" dirty="0"/>
+          </a:p>
+        </p:txBody>
+      </p:sp>
+      <p:pic>
+        <p:nvPicPr>
+          <p:cNvPr id="4" name="Picture 3"/>
+          <p:cNvPicPr>
+            <a:picLocks noChangeAspect="1"/>
+          </p:cNvPicPr>
+          <p:nvPr/>
+        </p:nvPicPr>
+        <p:blipFill>
+          <a:blip r:embed="rId2">
+            <a:extLst>
+              <a:ext uri="{28A0092B-C50C-407E-A947-70E740481C1C}">
+                <a14:useLocalDpi xmlns:a14="http://schemas.microsoft.com/office/drawing/2010/main" val="0"/>
+              </a:ext>
+            </a:extLst>
+          </a:blip>
+          <a:stretch>
+            <a:fillRect/>
+          </a:stretch>
+        </p:blipFill>
+        <p:spPr>
+          <a:xfrm>
+            <a:off x="609600" y="1828800"/>
+            <a:ext cx="7577210" cy="2362200"/>
+          </a:xfrm>
+          <a:prstGeom prst="rect">
+            <a:avLst/>
+          </a:prstGeom>
+        </p:spPr>
+      </p:pic>
+    </p:spTree>
+    <p:extLst>
+      <p:ext uri="{BB962C8B-B14F-4D97-AF65-F5344CB8AC3E}">
+        <p14:creationId xmlns:p14="http://schemas.microsoft.com/office/powerpoint/2010/main" val="359872843"/>
+      </p:ext>
+    </p:extLst>
+  </p:cSld>
+  <p:clrMapOvr>
+    <a:masterClrMapping/>
+  </p:clrMapOvr>
+</p:sld>
+</file>
+
+<file path=ppt/slides/slide8.xml><?xml version="1.0" encoding="utf-8"?>
+<p:sld xmlns:a="http://schemas.openxmlformats.org/drawingml/2006/main" xmlns:r="http://schemas.openxmlformats.org/officeDocument/2006/relationships" xmlns:p="http://schemas.openxmlformats.org/presentationml/2006/main">
+  <p:cSld>
+    <p:spTree>
+      <p:nvGrpSpPr>
+        <p:cNvPr id="1" name=""/>
+        <p:cNvGrpSpPr/>
+        <p:nvPr/>
+      </p:nvGrpSpPr>
+      <p:grpSpPr>
+        <a:xfrm>
+          <a:off x="0" y="0"/>
+          <a:ext cx="0" cy="0"/>
+          <a:chOff x="0" y="0"/>
+          <a:chExt cx="0" cy="0"/>
+        </a:xfrm>
+      </p:grpSpPr>
+      <p:sp>
+        <p:nvSpPr>
+          <p:cNvPr id="2" name="Title 1"/>
+          <p:cNvSpPr>
+            <a:spLocks noGrp="1"/>
+          </p:cNvSpPr>
+          <p:nvPr>
+            <p:ph type="title"/>
+          </p:nvPr>
+        </p:nvSpPr>
         <p:spPr>
           <a:xfrm>
             <a:off x="609599" y="584200"/>
@@ -8226,126 +8562,6 @@
 </p:sld>
 </file>
 
-<file path=ppt/slides/slide8.xml><?xml version="1.0" encoding="utf-8"?>
-<p:sld xmlns:a="http://schemas.openxmlformats.org/drawingml/2006/main" xmlns:r="http://schemas.openxmlformats.org/officeDocument/2006/relationships" xmlns:p="http://schemas.openxmlformats.org/presentationml/2006/main">
-  <p:cSld>
-    <p:spTree>
-      <p:nvGrpSpPr>
-        <p:cNvPr id="1" name=""/>
-        <p:cNvGrpSpPr/>
-        <p:nvPr/>
-      </p:nvGrpSpPr>
-      <p:grpSpPr>
-        <a:xfrm>
-          <a:off x="0" y="0"/>
-          <a:ext cx="0" cy="0"/>
-          <a:chOff x="0" y="0"/>
-          <a:chExt cx="0" cy="0"/>
-        </a:xfrm>
-      </p:grpSpPr>
-      <p:sp>
-        <p:nvSpPr>
-          <p:cNvPr id="2" name="Title 1"/>
-          <p:cNvSpPr>
-            <a:spLocks noGrp="1"/>
-          </p:cNvSpPr>
-          <p:nvPr>
-            <p:ph type="title"/>
-          </p:nvPr>
-        </p:nvSpPr>
-        <p:spPr/>
-        <p:txBody>
-          <a:bodyPr/>
-          <a:lstStyle/>
-          <a:p>
-            <a:r>
-              <a:rPr lang="en-US" dirty="0" smtClean="0"/>
-              <a:t>Different Control Flows</a:t>
-            </a:r>
-            <a:endParaRPr lang="en-US" dirty="0"/>
-          </a:p>
-        </p:txBody>
-      </p:sp>
-      <p:sp>
-        <p:nvSpPr>
-          <p:cNvPr id="3" name="Content Placeholder 2"/>
-          <p:cNvSpPr>
-            <a:spLocks noGrp="1"/>
-          </p:cNvSpPr>
-          <p:nvPr>
-            <p:ph idx="1"/>
-          </p:nvPr>
-        </p:nvSpPr>
-        <p:spPr/>
-        <p:txBody>
-          <a:bodyPr/>
-          <a:lstStyle/>
-          <a:p>
-            <a:r>
-              <a:rPr lang="en-US" dirty="0" smtClean="0"/>
-              <a:t>You want to be able to execute tasks in :</a:t>
-            </a:r>
-          </a:p>
-          <a:p>
-            <a:pPr lvl="1"/>
-            <a:r>
-              <a:rPr lang="en-US" dirty="0" smtClean="0"/>
-              <a:t>Series</a:t>
-            </a:r>
-          </a:p>
-          <a:p>
-            <a:pPr lvl="1"/>
-            <a:r>
-              <a:rPr lang="en-US" dirty="0" smtClean="0"/>
-              <a:t>Parallel</a:t>
-            </a:r>
-          </a:p>
-          <a:p>
-            <a:r>
-              <a:rPr lang="en-US" dirty="0" smtClean="0"/>
-              <a:t>Even implementing </a:t>
-            </a:r>
-            <a:r>
-              <a:rPr lang="en-US" dirty="0"/>
-              <a:t>a</a:t>
-            </a:r>
-            <a:r>
-              <a:rPr lang="en-US" dirty="0" smtClean="0"/>
-              <a:t>rray </a:t>
-            </a:r>
-            <a:r>
-              <a:rPr lang="en-US" dirty="0" smtClean="0"/>
-              <a:t>mapping using pure asynchronous </a:t>
-            </a:r>
-            <a:r>
-              <a:rPr lang="en-US" dirty="0" smtClean="0"/>
-              <a:t>functions very </a:t>
-            </a:r>
-            <a:r>
-              <a:rPr lang="en-US" dirty="0" smtClean="0"/>
-              <a:t>hard with plane </a:t>
-            </a:r>
-            <a:r>
-              <a:rPr lang="en-US" dirty="0" err="1" smtClean="0"/>
-              <a:t>callabcks</a:t>
-            </a:r>
-            <a:endParaRPr lang="en-US" dirty="0"/>
-          </a:p>
-        </p:txBody>
-      </p:sp>
-    </p:spTree>
-    <p:extLst>
-      <p:ext uri="{BB962C8B-B14F-4D97-AF65-F5344CB8AC3E}">
-        <p14:creationId xmlns:p14="http://schemas.microsoft.com/office/powerpoint/2010/main" val="421619244"/>
-      </p:ext>
-    </p:extLst>
-  </p:cSld>
-  <p:clrMapOvr>
-    <a:masterClrMapping/>
-  </p:clrMapOvr>
-</p:sld>
-</file>
-
 <file path=ppt/slides/slide9.xml><?xml version="1.0" encoding="utf-8"?>
 <p:sld xmlns:a="http://schemas.openxmlformats.org/drawingml/2006/main" xmlns:r="http://schemas.openxmlformats.org/officeDocument/2006/relationships" xmlns:p="http://schemas.openxmlformats.org/presentationml/2006/main">
   <p:cSld>
@@ -8380,58 +8596,71 @@
           <a:p>
             <a:r>
               <a:rPr lang="en-US" dirty="0" smtClean="0"/>
-              <a:t>First </a:t>
-            </a:r>
+              <a:t>Different Control Flows</a:t>
+            </a:r>
+            <a:endParaRPr lang="en-US" dirty="0"/>
+          </a:p>
+        </p:txBody>
+      </p:sp>
+      <p:sp>
+        <p:nvSpPr>
+          <p:cNvPr id="3" name="Content Placeholder 2"/>
+          <p:cNvSpPr>
+            <a:spLocks noGrp="1"/>
+          </p:cNvSpPr>
+          <p:nvPr>
+            <p:ph idx="1"/>
+          </p:nvPr>
+        </p:nvSpPr>
+        <p:spPr/>
+        <p:txBody>
+          <a:bodyPr/>
+          <a:lstStyle/>
+          <a:p>
             <a:r>
               <a:rPr lang="en-US" dirty="0" smtClean="0"/>
-              <a:t>came </a:t>
+              <a:t>You want to be able to execute tasks in :</a:t>
+            </a:r>
+          </a:p>
+          <a:p>
+            <a:pPr lvl="1"/>
+            <a:r>
+              <a:rPr lang="en-US" dirty="0" smtClean="0"/>
+              <a:t>Series</a:t>
+            </a:r>
+          </a:p>
+          <a:p>
+            <a:pPr lvl="1"/>
+            <a:r>
+              <a:rPr lang="en-US" dirty="0" smtClean="0"/>
+              <a:t>Parallel</a:t>
+            </a:r>
+          </a:p>
+          <a:p>
+            <a:r>
+              <a:rPr lang="en-US" dirty="0" smtClean="0"/>
+              <a:t>Even implementing </a:t>
+            </a:r>
+            <a:r>
+              <a:rPr lang="en-US" dirty="0"/>
+              <a:t>a</a:t>
+            </a:r>
+            <a:r>
+              <a:rPr lang="en-US" dirty="0" smtClean="0"/>
+              <a:t>rray mapping using pure asynchronous functions very hard with plane </a:t>
             </a:r>
             <a:r>
               <a:rPr lang="en-US" dirty="0" err="1" smtClean="0"/>
-              <a:t>async</a:t>
-            </a:r>
-            <a:r>
-              <a:rPr lang="en-US" dirty="0" smtClean="0"/>
-              <a:t> library</a:t>
+              <a:t>callabcks</a:t>
             </a:r>
             <a:endParaRPr lang="en-US" dirty="0"/>
           </a:p>
         </p:txBody>
       </p:sp>
-      <p:pic>
-        <p:nvPicPr>
-          <p:cNvPr id="4" name="Picture 3"/>
-          <p:cNvPicPr>
-            <a:picLocks noChangeAspect="1"/>
-          </p:cNvPicPr>
-          <p:nvPr/>
-        </p:nvPicPr>
-        <p:blipFill>
-          <a:blip r:embed="rId2">
-            <a:extLst>
-              <a:ext uri="{28A0092B-C50C-407E-A947-70E740481C1C}">
-                <a14:useLocalDpi xmlns:a14="http://schemas.microsoft.com/office/drawing/2010/main" val="0"/>
-              </a:ext>
-            </a:extLst>
-          </a:blip>
-          <a:stretch>
-            <a:fillRect/>
-          </a:stretch>
-        </p:blipFill>
-        <p:spPr>
-          <a:xfrm>
-            <a:off x="685800" y="1828800"/>
-            <a:ext cx="6901368" cy="1524000"/>
-          </a:xfrm>
-          <a:prstGeom prst="rect">
-            <a:avLst/>
-          </a:prstGeom>
-        </p:spPr>
-      </p:pic>
     </p:spTree>
     <p:extLst>
       <p:ext uri="{BB962C8B-B14F-4D97-AF65-F5344CB8AC3E}">
-        <p14:creationId xmlns:p14="http://schemas.microsoft.com/office/powerpoint/2010/main" val="3283686610"/>
+        <p14:creationId xmlns:p14="http://schemas.microsoft.com/office/powerpoint/2010/main" val="421619244"/>
       </p:ext>
     </p:extLst>
   </p:cSld>
@@ -8692,7 +8921,7 @@
   <a:extraClrSchemeLst/>
   <a:extLst>
     <a:ext uri="{05A4C25C-085E-4340-85A3-A5531E510DB2}">
-      <thm15:themeFamily xmlns="" xmlns:thm15="http://schemas.microsoft.com/office/thememl/2012/main" name="Facet" id="{C0C680CD-088A-49FC-A102-D699147F32B2}" vid="{CFBC31BA-B70F-4F30-BCAA-4F3011E16C4D}"/>
+      <thm15:themeFamily xmlns:thm15="http://schemas.microsoft.com/office/thememl/2012/main" xmlns="" name="Facet" id="{C0C680CD-088A-49FC-A102-D699147F32B2}" vid="{CFBC31BA-B70F-4F30-BCAA-4F3011E16C4D}"/>
     </a:ext>
   </a:extLst>
 </a:theme>

</xml_diff>